<commit_message>
new requirements txt without weird path
</commit_message>
<xml_diff>
--- a/python_training.pptx
+++ b/python_training.pptx
@@ -314,7 +314,7 @@
             <a:fld id="{DE7F393C-6EC8-45EA-8A7B-CAE425F76153}" type="datetimeFigureOut">
               <a:rPr lang="nl-NL" smtClean="0"/>
               <a:pPr/>
-              <a:t>29-09-2025</a:t>
+              <a:t>30-09-2025</a:t>
             </a:fld>
             <a:endParaRPr lang="nl-NL" dirty="0"/>
           </a:p>
@@ -481,7 +481,7 @@
             <a:fld id="{7CAC0B33-3943-42F1-973C-9CDD51C76BBD}" type="datetimeFigureOut">
               <a:rPr lang="nl-NL" smtClean="0"/>
               <a:pPr/>
-              <a:t>29-09-2025</a:t>
+              <a:t>30-09-2025</a:t>
             </a:fld>
             <a:endParaRPr lang="nl-NL" dirty="0"/>
           </a:p>
@@ -3115,7 +3115,7 @@
           <a:p>
             <a:fld id="{1FEA0735-A13F-3740-81A5-6F7760FA6F86}" type="datetime1">
               <a:rPr lang="nl-NL" smtClean="0"/>
-              <a:t>29-09-2025</a:t>
+              <a:t>30-09-2025</a:t>
             </a:fld>
             <a:endParaRPr lang="nl-NL" dirty="0"/>
           </a:p>
@@ -3215,7 +3215,7 @@
           <a:p>
             <a:fld id="{FA626ECE-4E9A-2445-89CC-59E5AEA471FB}" type="datetime1">
               <a:rPr lang="nl-NL" smtClean="0"/>
-              <a:t>29-09-2025</a:t>
+              <a:t>30-09-2025</a:t>
             </a:fld>
             <a:endParaRPr lang="nl-NL" dirty="0"/>
           </a:p>
@@ -3394,7 +3394,7 @@
           <a:p>
             <a:fld id="{9839CB03-DCF2-B749-ACCB-57353B868F10}" type="datetime1">
               <a:rPr lang="nl-NL" smtClean="0"/>
-              <a:t>29-09-2025</a:t>
+              <a:t>30-09-2025</a:t>
             </a:fld>
             <a:endParaRPr lang="nl-NL" dirty="0"/>
           </a:p>
@@ -8149,7 +8149,7 @@
           <a:p>
             <a:fld id="{BED4F09C-BF30-3C43-B96A-CD345CB1A3FE}" type="datetime1">
               <a:rPr lang="nl-NL" smtClean="0"/>
-              <a:t>29-09-2025</a:t>
+              <a:t>30-09-2025</a:t>
             </a:fld>
             <a:endParaRPr lang="nl-NL" dirty="0"/>
           </a:p>
@@ -8337,7 +8337,7 @@
           <a:p>
             <a:fld id="{096FFC3B-5CFB-474C-81EA-59B1FBACC21A}" type="datetime1">
               <a:rPr lang="nl-NL" smtClean="0"/>
-              <a:t>29-09-2025</a:t>
+              <a:t>30-09-2025</a:t>
             </a:fld>
             <a:endParaRPr lang="nl-NL" dirty="0"/>
           </a:p>
@@ -9232,7 +9232,7 @@
           <a:p>
             <a:fld id="{9D03F2BE-35A0-5446-85B8-E1133D43A555}" type="datetime1">
               <a:rPr lang="nl-NL" smtClean="0"/>
-              <a:t>29-09-2025</a:t>
+              <a:t>30-09-2025</a:t>
             </a:fld>
             <a:endParaRPr lang="nl-NL" dirty="0"/>
           </a:p>
@@ -10193,7 +10193,7 @@
           <a:p>
             <a:fld id="{9839CB03-DCF2-B749-ACCB-57353B868F10}" type="datetime1">
               <a:rPr lang="nl-NL" smtClean="0"/>
-              <a:t>29-09-2025</a:t>
+              <a:t>30-09-2025</a:t>
             </a:fld>
             <a:endParaRPr lang="nl-NL" dirty="0"/>
           </a:p>
@@ -10670,7 +10670,7 @@
           <a:p>
             <a:fld id="{A5595819-24CA-7745-A855-E53B1CFFEB90}" type="datetime1">
               <a:rPr lang="nl-NL" smtClean="0"/>
-              <a:t>29-09-2025</a:t>
+              <a:t>30-09-2025</a:t>
             </a:fld>
             <a:endParaRPr lang="nl-NL" dirty="0"/>
           </a:p>
@@ -10735,7 +10735,7 @@
           <a:p>
             <a:fld id="{9839CB03-DCF2-B749-ACCB-57353B868F10}" type="datetime1">
               <a:rPr lang="nl-NL" smtClean="0"/>
-              <a:t>29-09-2025</a:t>
+              <a:t>30-09-2025</a:t>
             </a:fld>
             <a:endParaRPr lang="nl-NL" dirty="0"/>
           </a:p>
@@ -11502,7 +11502,7 @@
           <a:p>
             <a:fld id="{9839CB03-DCF2-B749-ACCB-57353B868F10}" type="datetime1">
               <a:rPr lang="nl-NL" smtClean="0"/>
-              <a:t>29-09-2025</a:t>
+              <a:t>30-09-2025</a:t>
             </a:fld>
             <a:endParaRPr lang="nl-NL" dirty="0"/>
           </a:p>
@@ -11733,7 +11733,7 @@
           <a:p>
             <a:fld id="{9839CB03-DCF2-B749-ACCB-57353B868F10}" type="datetime1">
               <a:rPr lang="nl-NL" smtClean="0"/>
-              <a:t>29-09-2025</a:t>
+              <a:t>30-09-2025</a:t>
             </a:fld>
             <a:endParaRPr lang="nl-NL" dirty="0"/>
           </a:p>
@@ -12062,7 +12062,7 @@
           <a:p>
             <a:fld id="{9839CB03-DCF2-B749-ACCB-57353B868F10}" type="datetime1">
               <a:rPr lang="nl-NL" smtClean="0"/>
-              <a:t>29-09-2025</a:t>
+              <a:t>30-09-2025</a:t>
             </a:fld>
             <a:endParaRPr lang="nl-NL" dirty="0"/>
           </a:p>
@@ -12287,7 +12287,7 @@
           <a:p>
             <a:fld id="{9839CB03-DCF2-B749-ACCB-57353B868F10}" type="datetime1">
               <a:rPr lang="nl-NL" smtClean="0"/>
-              <a:t>29-09-2025</a:t>
+              <a:t>30-09-2025</a:t>
             </a:fld>
             <a:endParaRPr lang="nl-NL" dirty="0"/>
           </a:p>
@@ -12524,7 +12524,7 @@
           <a:p>
             <a:fld id="{9839CB03-DCF2-B749-ACCB-57353B868F10}" type="datetime1">
               <a:rPr lang="nl-NL" smtClean="0"/>
-              <a:t>29-09-2025</a:t>
+              <a:t>30-09-2025</a:t>
             </a:fld>
             <a:endParaRPr lang="nl-NL" dirty="0"/>
           </a:p>
@@ -12753,7 +12753,7 @@
           <a:p>
             <a:fld id="{9839CB03-DCF2-B749-ACCB-57353B868F10}" type="datetime1">
               <a:rPr lang="nl-NL" smtClean="0"/>
-              <a:t>29-09-2025</a:t>
+              <a:t>30-09-2025</a:t>
             </a:fld>
             <a:endParaRPr lang="nl-NL" dirty="0"/>
           </a:p>
@@ -12990,7 +12990,7 @@
           <a:p>
             <a:fld id="{9839CB03-DCF2-B749-ACCB-57353B868F10}" type="datetime1">
               <a:rPr lang="nl-NL" smtClean="0"/>
-              <a:t>29-09-2025</a:t>
+              <a:t>30-09-2025</a:t>
             </a:fld>
             <a:endParaRPr lang="nl-NL" dirty="0"/>
           </a:p>
@@ -13240,7 +13240,7 @@
           <a:p>
             <a:fld id="{9839CB03-DCF2-B749-ACCB-57353B868F10}" type="datetime1">
               <a:rPr lang="nl-NL" smtClean="0"/>
-              <a:t>29-09-2025</a:t>
+              <a:t>30-09-2025</a:t>
             </a:fld>
             <a:endParaRPr lang="nl-NL" dirty="0"/>
           </a:p>
@@ -13469,7 +13469,7 @@
           <a:p>
             <a:fld id="{9839CB03-DCF2-B749-ACCB-57353B868F10}" type="datetime1">
               <a:rPr lang="nl-NL" smtClean="0"/>
-              <a:t>29-09-2025</a:t>
+              <a:t>30-09-2025</a:t>
             </a:fld>
             <a:endParaRPr lang="nl-NL" dirty="0"/>
           </a:p>
@@ -13898,7 +13898,7 @@
           <a:p>
             <a:fld id="{9839CB03-DCF2-B749-ACCB-57353B868F10}" type="datetime1">
               <a:rPr lang="nl-NL" smtClean="0"/>
-              <a:t>29-09-2025</a:t>
+              <a:t>30-09-2025</a:t>
             </a:fld>
             <a:endParaRPr lang="nl-NL" dirty="0"/>
           </a:p>
@@ -14057,7 +14057,7 @@
           <a:p>
             <a:fld id="{9839CB03-DCF2-B749-ACCB-57353B868F10}" type="datetime1">
               <a:rPr lang="nl-NL" smtClean="0"/>
-              <a:t>29-09-2025</a:t>
+              <a:t>30-09-2025</a:t>
             </a:fld>
             <a:endParaRPr lang="nl-NL" dirty="0"/>
           </a:p>
@@ -14976,7 +14976,7 @@
           <a:p>
             <a:fld id="{9839CB03-DCF2-B749-ACCB-57353B868F10}" type="datetime1">
               <a:rPr lang="nl-NL" smtClean="0"/>
-              <a:t>29-09-2025</a:t>
+              <a:t>30-09-2025</a:t>
             </a:fld>
             <a:endParaRPr lang="nl-NL" dirty="0"/>
           </a:p>
@@ -15203,7 +15203,7 @@
           <a:p>
             <a:fld id="{9839CB03-DCF2-B749-ACCB-57353B868F10}" type="datetime1">
               <a:rPr lang="nl-NL" smtClean="0"/>
-              <a:t>29-09-2025</a:t>
+              <a:t>30-09-2025</a:t>
             </a:fld>
             <a:endParaRPr lang="nl-NL" dirty="0"/>
           </a:p>
@@ -16781,7 +16781,7 @@
           <a:p>
             <a:fld id="{9839CB03-DCF2-B749-ACCB-57353B868F10}" type="datetime1">
               <a:rPr lang="nl-NL" smtClean="0"/>
-              <a:t>29-09-2025</a:t>
+              <a:t>30-09-2025</a:t>
             </a:fld>
             <a:endParaRPr lang="nl-NL" dirty="0"/>
           </a:p>
@@ -17003,7 +17003,7 @@
           <a:p>
             <a:fld id="{9839CB03-DCF2-B749-ACCB-57353B868F10}" type="datetime1">
               <a:rPr lang="nl-NL" smtClean="0"/>
-              <a:t>29-09-2025</a:t>
+              <a:t>30-09-2025</a:t>
             </a:fld>
             <a:endParaRPr lang="nl-NL" dirty="0"/>
           </a:p>
@@ -17910,7 +17910,7 @@
           <a:p>
             <a:fld id="{9839CB03-DCF2-B749-ACCB-57353B868F10}" type="datetime1">
               <a:rPr lang="nl-NL" smtClean="0"/>
-              <a:t>29-09-2025</a:t>
+              <a:t>30-09-2025</a:t>
             </a:fld>
             <a:endParaRPr lang="nl-NL" dirty="0"/>
           </a:p>
@@ -18411,7 +18411,7 @@
           <a:p>
             <a:fld id="{9839CB03-DCF2-B749-ACCB-57353B868F10}" type="datetime1">
               <a:rPr lang="nl-NL" smtClean="0"/>
-              <a:t>29-09-2025</a:t>
+              <a:t>30-09-2025</a:t>
             </a:fld>
             <a:endParaRPr lang="nl-NL" dirty="0"/>
           </a:p>
@@ -18633,7 +18633,7 @@
           <a:p>
             <a:fld id="{9839CB03-DCF2-B749-ACCB-57353B868F10}" type="datetime1">
               <a:rPr lang="nl-NL" smtClean="0"/>
-              <a:t>29-09-2025</a:t>
+              <a:t>30-09-2025</a:t>
             </a:fld>
             <a:endParaRPr lang="nl-NL" dirty="0"/>
           </a:p>
@@ -19243,7 +19243,7 @@
           <a:p>
             <a:fld id="{9839CB03-DCF2-B749-ACCB-57353B868F10}" type="datetime1">
               <a:rPr lang="nl-NL" smtClean="0"/>
-              <a:t>29-09-2025</a:t>
+              <a:t>30-09-2025</a:t>
             </a:fld>
             <a:endParaRPr lang="nl-NL" dirty="0"/>
           </a:p>
@@ -19645,7 +19645,7 @@
           <a:p>
             <a:fld id="{A5595819-24CA-7745-A855-E53B1CFFEB90}" type="datetime1">
               <a:rPr lang="nl-NL" smtClean="0"/>
-              <a:t>29-09-2025</a:t>
+              <a:t>30-09-2025</a:t>
             </a:fld>
             <a:endParaRPr lang="nl-NL" dirty="0"/>
           </a:p>
@@ -19743,7 +19743,7 @@
           <a:p>
             <a:fld id="{9839CB03-DCF2-B749-ACCB-57353B868F10}" type="datetime1">
               <a:rPr lang="nl-NL" smtClean="0"/>
-              <a:t>29-09-2025</a:t>
+              <a:t>30-09-2025</a:t>
             </a:fld>
             <a:endParaRPr lang="nl-NL" dirty="0"/>
           </a:p>
@@ -19983,7 +19983,7 @@
           <a:p>
             <a:fld id="{9839CB03-DCF2-B749-ACCB-57353B868F10}" type="datetime1">
               <a:rPr lang="nl-NL" smtClean="0"/>
-              <a:t>29-09-2025</a:t>
+              <a:t>30-09-2025</a:t>
             </a:fld>
             <a:endParaRPr lang="nl-NL" dirty="0"/>
           </a:p>
@@ -21116,7 +21116,7 @@
           <a:p>
             <a:fld id="{9839CB03-DCF2-B749-ACCB-57353B868F10}" type="datetime1">
               <a:rPr lang="nl-NL" smtClean="0"/>
-              <a:t>29-09-2025</a:t>
+              <a:t>30-09-2025</a:t>
             </a:fld>
             <a:endParaRPr lang="nl-NL" dirty="0"/>
           </a:p>
@@ -21363,7 +21363,7 @@
           <a:p>
             <a:fld id="{9839CB03-DCF2-B749-ACCB-57353B868F10}" type="datetime1">
               <a:rPr lang="nl-NL" smtClean="0"/>
-              <a:t>29-09-2025</a:t>
+              <a:t>30-09-2025</a:t>
             </a:fld>
             <a:endParaRPr lang="nl-NL" dirty="0"/>
           </a:p>
@@ -21639,7 +21639,7 @@
           <a:p>
             <a:fld id="{9839CB03-DCF2-B749-ACCB-57353B868F10}" type="datetime1">
               <a:rPr lang="nl-NL" smtClean="0"/>
-              <a:t>29-09-2025</a:t>
+              <a:t>30-09-2025</a:t>
             </a:fld>
             <a:endParaRPr lang="nl-NL" dirty="0"/>
           </a:p>
@@ -21806,7 +21806,7 @@
           <a:p>
             <a:fld id="{A5595819-24CA-7745-A855-E53B1CFFEB90}" type="datetime1">
               <a:rPr lang="nl-NL" smtClean="0"/>
-              <a:t>29-09-2025</a:t>
+              <a:t>30-09-2025</a:t>
             </a:fld>
             <a:endParaRPr lang="nl-NL" dirty="0"/>
           </a:p>
@@ -21904,7 +21904,7 @@
           <a:p>
             <a:fld id="{9839CB03-DCF2-B749-ACCB-57353B868F10}" type="datetime1">
               <a:rPr lang="nl-NL" smtClean="0"/>
-              <a:t>29-09-2025</a:t>
+              <a:t>30-09-2025</a:t>
             </a:fld>
             <a:endParaRPr lang="nl-NL" dirty="0"/>
           </a:p>
@@ -22293,7 +22293,7 @@
           <a:p>
             <a:fld id="{9839CB03-DCF2-B749-ACCB-57353B868F10}" type="datetime1">
               <a:rPr lang="nl-NL" smtClean="0"/>
-              <a:t>29-09-2025</a:t>
+              <a:t>30-09-2025</a:t>
             </a:fld>
             <a:endParaRPr lang="nl-NL" dirty="0"/>
           </a:p>
@@ -22485,7 +22485,7 @@
           <a:p>
             <a:fld id="{9839CB03-DCF2-B749-ACCB-57353B868F10}" type="datetime1">
               <a:rPr lang="nl-NL" smtClean="0"/>
-              <a:t>29-09-2025</a:t>
+              <a:t>30-09-2025</a:t>
             </a:fld>
             <a:endParaRPr lang="nl-NL" dirty="0"/>
           </a:p>
@@ -22677,7 +22677,7 @@
           <a:p>
             <a:fld id="{9839CB03-DCF2-B749-ACCB-57353B868F10}" type="datetime1">
               <a:rPr lang="nl-NL" smtClean="0"/>
-              <a:t>29-09-2025</a:t>
+              <a:t>30-09-2025</a:t>
             </a:fld>
             <a:endParaRPr lang="nl-NL" dirty="0"/>
           </a:p>
@@ -23681,7 +23681,7 @@
           <a:p>
             <a:fld id="{9839CB03-DCF2-B749-ACCB-57353B868F10}" type="datetime1">
               <a:rPr lang="nl-NL" smtClean="0"/>
-              <a:t>29-09-2025</a:t>
+              <a:t>30-09-2025</a:t>
             </a:fld>
             <a:endParaRPr lang="nl-NL" dirty="0"/>
           </a:p>
@@ -24088,7 +24088,7 @@
           <a:p>
             <a:fld id="{9839CB03-DCF2-B749-ACCB-57353B868F10}" type="datetime1">
               <a:rPr lang="nl-NL" smtClean="0"/>
-              <a:t>29-09-2025</a:t>
+              <a:t>30-09-2025</a:t>
             </a:fld>
             <a:endParaRPr lang="nl-NL" dirty="0"/>
           </a:p>
@@ -24310,7 +24310,7 @@
           <a:p>
             <a:fld id="{9839CB03-DCF2-B749-ACCB-57353B868F10}" type="datetime1">
               <a:rPr lang="nl-NL" smtClean="0"/>
-              <a:t>29-09-2025</a:t>
+              <a:t>30-09-2025</a:t>
             </a:fld>
             <a:endParaRPr lang="nl-NL" dirty="0"/>
           </a:p>
@@ -25031,7 +25031,7 @@
           <a:p>
             <a:fld id="{9839CB03-DCF2-B749-ACCB-57353B868F10}" type="datetime1">
               <a:rPr lang="nl-NL" smtClean="0"/>
-              <a:t>29-09-2025</a:t>
+              <a:t>30-09-2025</a:t>
             </a:fld>
             <a:endParaRPr lang="nl-NL" dirty="0"/>
           </a:p>
@@ -25458,7 +25458,7 @@
           <a:p>
             <a:fld id="{9839CB03-DCF2-B749-ACCB-57353B868F10}" type="datetime1">
               <a:rPr lang="nl-NL" smtClean="0"/>
-              <a:t>29-09-2025</a:t>
+              <a:t>30-09-2025</a:t>
             </a:fld>
             <a:endParaRPr lang="nl-NL" dirty="0"/>
           </a:p>
@@ -25680,7 +25680,7 @@
           <a:p>
             <a:fld id="{9839CB03-DCF2-B749-ACCB-57353B868F10}" type="datetime1">
               <a:rPr lang="nl-NL" smtClean="0"/>
-              <a:t>29-09-2025</a:t>
+              <a:t>30-09-2025</a:t>
             </a:fld>
             <a:endParaRPr lang="nl-NL" dirty="0"/>
           </a:p>
@@ -26399,7 +26399,7 @@
           <a:p>
             <a:fld id="{9839CB03-DCF2-B749-ACCB-57353B868F10}" type="datetime1">
               <a:rPr lang="nl-NL" smtClean="0"/>
-              <a:t>29-09-2025</a:t>
+              <a:t>30-09-2025</a:t>
             </a:fld>
             <a:endParaRPr lang="nl-NL" dirty="0"/>
           </a:p>
@@ -26826,7 +26826,7 @@
           <a:p>
             <a:fld id="{9839CB03-DCF2-B749-ACCB-57353B868F10}" type="datetime1">
               <a:rPr lang="nl-NL" smtClean="0"/>
-              <a:t>29-09-2025</a:t>
+              <a:t>30-09-2025</a:t>
             </a:fld>
             <a:endParaRPr lang="nl-NL" dirty="0"/>
           </a:p>
@@ -27018,7 +27018,7 @@
           <a:p>
             <a:fld id="{9839CB03-DCF2-B749-ACCB-57353B868F10}" type="datetime1">
               <a:rPr lang="nl-NL" smtClean="0"/>
-              <a:t>29-09-2025</a:t>
+              <a:t>30-09-2025</a:t>
             </a:fld>
             <a:endParaRPr lang="nl-NL" dirty="0"/>
           </a:p>
@@ -28042,7 +28042,7 @@
           <a:p>
             <a:fld id="{9839CB03-DCF2-B749-ACCB-57353B868F10}" type="datetime1">
               <a:rPr lang="nl-NL" smtClean="0"/>
-              <a:t>29-09-2025</a:t>
+              <a:t>30-09-2025</a:t>
             </a:fld>
             <a:endParaRPr lang="nl-NL" dirty="0"/>
           </a:p>
@@ -28981,7 +28981,7 @@
           <a:p>
             <a:fld id="{9839CB03-DCF2-B749-ACCB-57353B868F10}" type="datetime1">
               <a:rPr lang="nl-NL" smtClean="0"/>
-              <a:t>29-09-2025</a:t>
+              <a:t>30-09-2025</a:t>
             </a:fld>
             <a:endParaRPr lang="nl-NL" dirty="0"/>
           </a:p>
@@ -29309,7 +29309,7 @@
           <a:p>
             <a:fld id="{9839CB03-DCF2-B749-ACCB-57353B868F10}" type="datetime1">
               <a:rPr lang="nl-NL" smtClean="0"/>
-              <a:t>29-09-2025</a:t>
+              <a:t>30-09-2025</a:t>
             </a:fld>
             <a:endParaRPr lang="nl-NL" dirty="0"/>
           </a:p>
@@ -29865,7 +29865,7 @@
           <a:p>
             <a:fld id="{9839CB03-DCF2-B749-ACCB-57353B868F10}" type="datetime1">
               <a:rPr lang="nl-NL" smtClean="0"/>
-              <a:t>29-09-2025</a:t>
+              <a:t>30-09-2025</a:t>
             </a:fld>
             <a:endParaRPr lang="nl-NL" dirty="0"/>
           </a:p>
@@ -30499,7 +30499,7 @@
           <a:p>
             <a:fld id="{9839CB03-DCF2-B749-ACCB-57353B868F10}" type="datetime1">
               <a:rPr lang="nl-NL" smtClean="0"/>
-              <a:t>29-09-2025</a:t>
+              <a:t>30-09-2025</a:t>
             </a:fld>
             <a:endParaRPr lang="nl-NL" dirty="0"/>
           </a:p>
@@ -30841,7 +30841,7 @@
           <a:p>
             <a:fld id="{9839CB03-DCF2-B749-ACCB-57353B868F10}" type="datetime1">
               <a:rPr lang="nl-NL" smtClean="0"/>
-              <a:t>29-09-2025</a:t>
+              <a:t>30-09-2025</a:t>
             </a:fld>
             <a:endParaRPr lang="nl-NL" dirty="0"/>
           </a:p>
@@ -31092,7 +31092,7 @@
           <a:p>
             <a:fld id="{9839CB03-DCF2-B749-ACCB-57353B868F10}" type="datetime1">
               <a:rPr lang="nl-NL" smtClean="0"/>
-              <a:t>29-09-2025</a:t>
+              <a:t>30-09-2025</a:t>
             </a:fld>
             <a:endParaRPr lang="nl-NL" dirty="0"/>
           </a:p>
@@ -31454,7 +31454,7 @@
           <a:p>
             <a:fld id="{9839CB03-DCF2-B749-ACCB-57353B868F10}" type="datetime1">
               <a:rPr lang="nl-NL" smtClean="0"/>
-              <a:t>29-09-2025</a:t>
+              <a:t>30-09-2025</a:t>
             </a:fld>
             <a:endParaRPr lang="nl-NL" dirty="0"/>
           </a:p>
@@ -31627,7 +31627,7 @@
           <a:p>
             <a:fld id="{9839CB03-DCF2-B749-ACCB-57353B868F10}" type="datetime1">
               <a:rPr lang="nl-NL" smtClean="0"/>
-              <a:t>29-09-2025</a:t>
+              <a:t>30-09-2025</a:t>
             </a:fld>
             <a:endParaRPr lang="nl-NL" dirty="0"/>
           </a:p>
@@ -31750,7 +31750,7 @@
           <a:p>
             <a:fld id="{9839CB03-DCF2-B749-ACCB-57353B868F10}" type="datetime1">
               <a:rPr lang="nl-NL" smtClean="0"/>
-              <a:t>29-09-2025</a:t>
+              <a:t>30-09-2025</a:t>
             </a:fld>
             <a:endParaRPr lang="nl-NL" dirty="0"/>
           </a:p>
@@ -32441,7 +32441,7 @@
           <a:p>
             <a:fld id="{9839CB03-DCF2-B749-ACCB-57353B868F10}" type="datetime1">
               <a:rPr lang="nl-NL" smtClean="0"/>
-              <a:t>29-09-2025</a:t>
+              <a:t>30-09-2025</a:t>
             </a:fld>
             <a:endParaRPr lang="nl-NL" dirty="0"/>
           </a:p>
@@ -33082,7 +33082,7 @@
           <a:p>
             <a:fld id="{9839CB03-DCF2-B749-ACCB-57353B868F10}" type="datetime1">
               <a:rPr lang="nl-NL" smtClean="0"/>
-              <a:t>29-09-2025</a:t>
+              <a:t>30-09-2025</a:t>
             </a:fld>
             <a:endParaRPr lang="nl-NL" dirty="0"/>
           </a:p>
@@ -33629,7 +33629,7 @@
           <a:p>
             <a:fld id="{9839CB03-DCF2-B749-ACCB-57353B868F10}" type="datetime1">
               <a:rPr lang="nl-NL" smtClean="0"/>
-              <a:t>29-09-2025</a:t>
+              <a:t>30-09-2025</a:t>
             </a:fld>
             <a:endParaRPr lang="nl-NL" dirty="0"/>
           </a:p>

</xml_diff>